<commit_message>
Update figure with real values
</commit_message>
<xml_diff>
--- a/doc/step_options.pptx
+++ b/doc/step_options.pptx
@@ -3114,7 +3114,7 @@
         </p:nvSpPr>
         <p:spPr>
           <a:xfrm>
-            <a:off x="103908" y="-1968"/>
+            <a:off x="57728" y="-1968"/>
             <a:ext cx="877163" cy="369332"/>
           </a:xfrm>
           <a:prstGeom prst="rect">
@@ -3205,7 +3205,7 @@
         </p:nvSpPr>
         <p:spPr>
           <a:xfrm>
-            <a:off x="3143924" y="11679"/>
+            <a:off x="2924569" y="11679"/>
             <a:ext cx="2328883" cy="369332"/>
           </a:xfrm>
           <a:prstGeom prst="rect">
@@ -3282,7 +3282,7 @@
         </p:nvSpPr>
         <p:spPr>
           <a:xfrm>
-            <a:off x="82194" y="1796612"/>
+            <a:off x="59104" y="1796612"/>
             <a:ext cx="2449258" cy="369332"/>
           </a:xfrm>
           <a:prstGeom prst="rect">
@@ -3316,7 +3316,7 @@
         </p:nvSpPr>
         <p:spPr>
           <a:xfrm>
-            <a:off x="15239" y="3403682"/>
+            <a:off x="61419" y="3403682"/>
             <a:ext cx="1551063" cy="369332"/>
           </a:xfrm>
           <a:prstGeom prst="rect">
@@ -3350,7 +3350,7 @@
         </p:nvSpPr>
         <p:spPr>
           <a:xfrm>
-            <a:off x="167639" y="5114657"/>
+            <a:off x="63734" y="5114657"/>
             <a:ext cx="1707506" cy="369332"/>
           </a:xfrm>
           <a:prstGeom prst="rect">
@@ -3693,8 +3693,8 @@
         </p:nvSpPr>
         <p:spPr>
           <a:xfrm>
-            <a:off x="148475" y="3825232"/>
-            <a:ext cx="1171765" cy="523220"/>
+            <a:off x="256675" y="4015668"/>
+            <a:ext cx="678216" cy="307777"/>
           </a:xfrm>
           <a:prstGeom prst="rect">
             <a:avLst/>
@@ -3706,25 +3706,6 @@
             <a:spAutoFit/>
           </a:bodyPr>
           <a:lstStyle/>
-          <a:p>
-            <a:r>
-              <a:rPr lang="en-US" sz="1400" dirty="0" err="1" smtClean="0">
-                <a:solidFill>
-                  <a:srgbClr val="FF0000"/>
-                </a:solidFill>
-                <a:latin typeface="Consolas"/>
-                <a:cs typeface="Consolas"/>
-              </a:rPr>
-              <a:t>step_input</a:t>
-            </a:r>
-            <a:endParaRPr lang="en-US" sz="1400" dirty="0" smtClean="0">
-              <a:solidFill>
-                <a:srgbClr val="FF0000"/>
-              </a:solidFill>
-              <a:latin typeface="Consolas"/>
-              <a:cs typeface="Consolas"/>
-            </a:endParaRPr>
-          </a:p>
           <a:p>
             <a:r>
               <a:rPr lang="en-US" sz="1400" dirty="0" smtClean="0">
@@ -4024,8 +4005,8 @@
         </p:nvSpPr>
         <p:spPr>
           <a:xfrm>
-            <a:off x="6449567" y="9523"/>
-            <a:ext cx="1729147" cy="369332"/>
+            <a:off x="6126307" y="9523"/>
+            <a:ext cx="2242546" cy="369332"/>
           </a:xfrm>
           <a:prstGeom prst="rect">
             <a:avLst/>
@@ -4044,7 +4025,11 @@
             </a:r>
             <a:r>
               <a:rPr lang="en-US" dirty="0" smtClean="0"/>
-              <a:t> option </a:t>
+              <a:t> </a:t>
+            </a:r>
+            <a:r>
+              <a:rPr lang="en-US" dirty="0" smtClean="0"/>
+              <a:t>input option </a:t>
             </a:r>
             <a:endParaRPr lang="en-US" dirty="0"/>
           </a:p>
@@ -4428,7 +4413,7 @@
         </p:nvSpPr>
         <p:spPr>
           <a:xfrm>
-            <a:off x="3077852" y="2674678"/>
+            <a:off x="2904677" y="2582318"/>
             <a:ext cx="3164072" cy="646331"/>
           </a:xfrm>
           <a:prstGeom prst="rect">
@@ -4496,7 +4481,7 @@
         </p:nvSpPr>
         <p:spPr>
           <a:xfrm>
-            <a:off x="4230788" y="4112588"/>
+            <a:off x="4135828" y="3685423"/>
             <a:ext cx="678216" cy="307777"/>
           </a:xfrm>
           <a:prstGeom prst="rect">
@@ -4537,7 +4522,7 @@
         </p:nvSpPr>
         <p:spPr>
           <a:xfrm>
-            <a:off x="5053214" y="4512991"/>
+            <a:off x="4958254" y="4085826"/>
             <a:ext cx="579506" cy="307777"/>
           </a:xfrm>
           <a:prstGeom prst="rect">
@@ -4588,7 +4573,7 @@
         </p:nvSpPr>
         <p:spPr>
           <a:xfrm>
-            <a:off x="5080841" y="3997808"/>
+            <a:off x="4985881" y="3570643"/>
             <a:ext cx="304800" cy="822960"/>
           </a:xfrm>
           <a:prstGeom prst="leftBracket">
@@ -4628,7 +4613,7 @@
         </p:nvCxnSpPr>
         <p:spPr>
           <a:xfrm>
-            <a:off x="5385641" y="3997808"/>
+            <a:off x="5290681" y="3570643"/>
             <a:ext cx="643579" cy="2156"/>
           </a:xfrm>
           <a:prstGeom prst="line">
@@ -4663,7 +4648,7 @@
         </p:nvCxnSpPr>
         <p:spPr>
           <a:xfrm>
-            <a:off x="5385641" y="4820768"/>
+            <a:off x="5290681" y="4393603"/>
             <a:ext cx="643579" cy="2156"/>
           </a:xfrm>
           <a:prstGeom prst="line">
@@ -4696,7 +4681,7 @@
         </p:nvSpPr>
         <p:spPr>
           <a:xfrm>
-            <a:off x="6105398" y="3788624"/>
+            <a:off x="6010438" y="3361459"/>
             <a:ext cx="878389" cy="426548"/>
           </a:xfrm>
           <a:prstGeom prst="flowChartProcess">
@@ -4739,7 +4724,7 @@
         </p:nvSpPr>
         <p:spPr>
           <a:xfrm>
-            <a:off x="6105398" y="4607494"/>
+            <a:off x="6010438" y="4180329"/>
             <a:ext cx="878389" cy="426548"/>
           </a:xfrm>
           <a:prstGeom prst="flowChartProcess">
@@ -4782,7 +4767,7 @@
         </p:nvCxnSpPr>
         <p:spPr>
           <a:xfrm>
-            <a:off x="4511223" y="4420365"/>
+            <a:off x="4416263" y="3993200"/>
             <a:ext cx="569618" cy="0"/>
           </a:xfrm>
           <a:prstGeom prst="line">
@@ -4815,7 +4800,7 @@
         </p:nvSpPr>
         <p:spPr>
           <a:xfrm>
-            <a:off x="5089791" y="3704187"/>
+            <a:off x="4994831" y="3277022"/>
             <a:ext cx="579506" cy="307777"/>
           </a:xfrm>
           <a:prstGeom prst="rect">
@@ -4866,7 +4851,7 @@
         </p:nvSpPr>
         <p:spPr>
           <a:xfrm>
-            <a:off x="4230788" y="5546985"/>
+            <a:off x="4135828" y="5119820"/>
             <a:ext cx="678216" cy="307777"/>
           </a:xfrm>
           <a:prstGeom prst="rect">
@@ -4907,7 +4892,7 @@
         </p:nvSpPr>
         <p:spPr>
           <a:xfrm>
-            <a:off x="5062164" y="5969295"/>
+            <a:off x="4967204" y="5542130"/>
             <a:ext cx="579506" cy="307777"/>
           </a:xfrm>
           <a:prstGeom prst="rect">
@@ -4958,7 +4943,7 @@
         </p:nvSpPr>
         <p:spPr>
           <a:xfrm>
-            <a:off x="5089791" y="5454112"/>
+            <a:off x="4994831" y="5026947"/>
             <a:ext cx="304800" cy="822960"/>
           </a:xfrm>
           <a:prstGeom prst="leftBracket">
@@ -4998,7 +4983,7 @@
         </p:nvCxnSpPr>
         <p:spPr>
           <a:xfrm>
-            <a:off x="5394591" y="5454112"/>
+            <a:off x="5299631" y="5026947"/>
             <a:ext cx="643579" cy="2156"/>
           </a:xfrm>
           <a:prstGeom prst="line">
@@ -5033,7 +5018,7 @@
         </p:nvCxnSpPr>
         <p:spPr>
           <a:xfrm>
-            <a:off x="5394591" y="6277072"/>
+            <a:off x="5299631" y="5849907"/>
             <a:ext cx="643579" cy="2156"/>
           </a:xfrm>
           <a:prstGeom prst="line">
@@ -5066,7 +5051,7 @@
         </p:nvSpPr>
         <p:spPr>
           <a:xfrm>
-            <a:off x="6114348" y="5244928"/>
+            <a:off x="6019388" y="4817763"/>
             <a:ext cx="878389" cy="426548"/>
           </a:xfrm>
           <a:prstGeom prst="flowChartProcess">
@@ -5109,7 +5094,7 @@
         </p:nvSpPr>
         <p:spPr>
           <a:xfrm>
-            <a:off x="6114348" y="6063798"/>
+            <a:off x="6019388" y="5636633"/>
             <a:ext cx="878389" cy="426548"/>
           </a:xfrm>
           <a:prstGeom prst="flowChartProcess">
@@ -5152,7 +5137,7 @@
         </p:nvCxnSpPr>
         <p:spPr>
           <a:xfrm>
-            <a:off x="4520173" y="5876669"/>
+            <a:off x="4425213" y="5449504"/>
             <a:ext cx="569618" cy="0"/>
           </a:xfrm>
           <a:prstGeom prst="line">
@@ -5185,7 +5170,7 @@
         </p:nvSpPr>
         <p:spPr>
           <a:xfrm>
-            <a:off x="5079251" y="5146335"/>
+            <a:off x="4984291" y="4719170"/>
             <a:ext cx="579506" cy="307777"/>
           </a:xfrm>
           <a:prstGeom prst="rect">
@@ -5236,7 +5221,7 @@
         </p:nvSpPr>
         <p:spPr>
           <a:xfrm>
-            <a:off x="4206423" y="4420365"/>
+            <a:off x="4111463" y="3993200"/>
             <a:ext cx="304800" cy="1456304"/>
           </a:xfrm>
           <a:prstGeom prst="leftBracket">
@@ -5274,7 +5259,7 @@
         </p:nvCxnSpPr>
         <p:spPr>
           <a:xfrm flipV="1">
-            <a:off x="3077852" y="5034043"/>
+            <a:off x="2982892" y="4676148"/>
             <a:ext cx="1128571" cy="21822"/>
           </a:xfrm>
           <a:prstGeom prst="line">
@@ -5307,7 +5292,7 @@
         </p:nvSpPr>
         <p:spPr>
           <a:xfrm>
-            <a:off x="7453700" y="4748088"/>
+            <a:off x="7358740" y="4297833"/>
             <a:ext cx="1270475" cy="307777"/>
           </a:xfrm>
           <a:prstGeom prst="rect">
@@ -5349,7 +5334,7 @@
         </p:nvCxnSpPr>
         <p:spPr>
           <a:xfrm>
-            <a:off x="7466011" y="5145523"/>
+            <a:off x="7347961" y="4649088"/>
             <a:ext cx="1200178" cy="0"/>
           </a:xfrm>
           <a:prstGeom prst="line">
@@ -5382,7 +5367,7 @@
         </p:nvSpPr>
         <p:spPr>
           <a:xfrm rot="10800000">
-            <a:off x="7119868" y="3999964"/>
+            <a:off x="7024908" y="3572799"/>
             <a:ext cx="304800" cy="2301246"/>
           </a:xfrm>
           <a:prstGeom prst="leftBracket">
@@ -5672,7 +5657,7 @@
         </p:nvSpPr>
         <p:spPr>
           <a:xfrm>
-            <a:off x="3077852" y="4726265"/>
+            <a:off x="2936712" y="4345280"/>
             <a:ext cx="1171765" cy="307777"/>
           </a:xfrm>
           <a:prstGeom prst="rect">
@@ -5702,6 +5687,1140 @@
               <a:latin typeface="Consolas"/>
               <a:cs typeface="Consolas"/>
             </a:endParaRPr>
+          </a:p>
+        </p:txBody>
+      </p:sp>
+      <p:sp>
+        <p:nvSpPr>
+          <p:cNvPr id="2" name="TextBox 1"/>
+          <p:cNvSpPr txBox="1"/>
+          <p:nvPr/>
+        </p:nvSpPr>
+        <p:spPr>
+          <a:xfrm>
+            <a:off x="3549067" y="6214354"/>
+            <a:ext cx="4922742" cy="646331"/>
+          </a:xfrm>
+          <a:prstGeom prst="rect">
+            <a:avLst/>
+          </a:prstGeom>
+          <a:noFill/>
+        </p:spPr>
+        <p:txBody>
+          <a:bodyPr wrap="none" rtlCol="0">
+            <a:spAutoFit/>
+          </a:bodyPr>
+          <a:lstStyle/>
+          <a:p>
+            <a:r>
+              <a:rPr lang="en-US" sz="1200" dirty="0" smtClean="0">
+                <a:solidFill>
+                  <a:schemeClr val="bg2">
+                    <a:lumMod val="50000"/>
+                  </a:schemeClr>
+                </a:solidFill>
+                <a:latin typeface="Consolas"/>
+                <a:cs typeface="Consolas"/>
+              </a:rPr>
+              <a:t>input: [‘a1’,‘a2’]        output: [‘b1’,‘b2’,‘b3’,‘b4’] </a:t>
+            </a:r>
+          </a:p>
+          <a:p>
+            <a:r>
+              <a:rPr lang="en-US" sz="1200" dirty="0" err="1">
+                <a:solidFill>
+                  <a:schemeClr val="bg2">
+                    <a:lumMod val="50000"/>
+                  </a:schemeClr>
+                </a:solidFill>
+                <a:latin typeface="Consolas"/>
+                <a:cs typeface="Consolas"/>
+              </a:rPr>
+              <a:t>step_input</a:t>
+            </a:r>
+            <a:r>
+              <a:rPr lang="en-US" sz="1200" dirty="0">
+                <a:solidFill>
+                  <a:schemeClr val="bg2">
+                    <a:lumMod val="50000"/>
+                  </a:schemeClr>
+                </a:solidFill>
+                <a:latin typeface="Consolas"/>
+                <a:cs typeface="Consolas"/>
+              </a:rPr>
+              <a:t>=[‘</a:t>
+            </a:r>
+            <a:r>
+              <a:rPr lang="en-US" sz="1200" dirty="0" smtClean="0">
+                <a:solidFill>
+                  <a:schemeClr val="bg2">
+                    <a:lumMod val="50000"/>
+                  </a:schemeClr>
+                </a:solidFill>
+                <a:latin typeface="Consolas"/>
+                <a:cs typeface="Consolas"/>
+              </a:rPr>
+              <a:t>s1</a:t>
+            </a:r>
+            <a:r>
+              <a:rPr lang="en-US" sz="1200" dirty="0">
+                <a:solidFill>
+                  <a:schemeClr val="bg2">
+                    <a:lumMod val="50000"/>
+                  </a:schemeClr>
+                </a:solidFill>
+                <a:latin typeface="Consolas"/>
+                <a:cs typeface="Consolas"/>
+              </a:rPr>
+              <a:t>’,‘</a:t>
+            </a:r>
+            <a:r>
+              <a:rPr lang="en-US" sz="1200" dirty="0" smtClean="0">
+                <a:solidFill>
+                  <a:schemeClr val="bg2">
+                    <a:lumMod val="50000"/>
+                  </a:schemeClr>
+                </a:solidFill>
+                <a:latin typeface="Consolas"/>
+                <a:cs typeface="Consolas"/>
+              </a:rPr>
+              <a:t>s2</a:t>
+            </a:r>
+            <a:r>
+              <a:rPr lang="en-US" sz="1200" dirty="0">
+                <a:solidFill>
+                  <a:schemeClr val="bg2">
+                    <a:lumMod val="50000"/>
+                  </a:schemeClr>
+                </a:solidFill>
+                <a:latin typeface="Consolas"/>
+                <a:cs typeface="Consolas"/>
+              </a:rPr>
+              <a:t>’</a:t>
+            </a:r>
+            <a:r>
+              <a:rPr lang="en-US" sz="1200" dirty="0" smtClean="0">
+                <a:solidFill>
+                  <a:schemeClr val="bg2">
+                    <a:lumMod val="50000"/>
+                  </a:schemeClr>
+                </a:solidFill>
+                <a:latin typeface="Consolas"/>
+                <a:cs typeface="Consolas"/>
+              </a:rPr>
+              <a:t>]    </a:t>
+            </a:r>
+            <a:r>
+              <a:rPr lang="en-US" sz="1200" dirty="0" err="1" smtClean="0">
+                <a:solidFill>
+                  <a:schemeClr val="bg2">
+                    <a:lumMod val="50000"/>
+                  </a:schemeClr>
+                </a:solidFill>
+                <a:latin typeface="Consolas"/>
+                <a:cs typeface="Consolas"/>
+              </a:rPr>
+              <a:t>group_by</a:t>
+            </a:r>
+            <a:r>
+              <a:rPr lang="en-US" sz="1200" dirty="0" smtClean="0">
+                <a:solidFill>
+                  <a:schemeClr val="bg2">
+                    <a:lumMod val="50000"/>
+                  </a:schemeClr>
+                </a:solidFill>
+                <a:latin typeface="Consolas"/>
+                <a:cs typeface="Consolas"/>
+              </a:rPr>
+              <a:t>=‘single’</a:t>
+            </a:r>
+          </a:p>
+          <a:p>
+            <a:r>
+              <a:rPr lang="en-US" sz="1200" dirty="0" err="1" smtClean="0">
+                <a:solidFill>
+                  <a:schemeClr val="bg2">
+                    <a:lumMod val="50000"/>
+                  </a:schemeClr>
+                </a:solidFill>
+                <a:latin typeface="Consolas"/>
+                <a:cs typeface="Consolas"/>
+              </a:rPr>
+              <a:t>var</a:t>
+            </a:r>
+            <a:r>
+              <a:rPr lang="en-US" sz="1200" dirty="0" smtClean="0">
+                <a:solidFill>
+                  <a:schemeClr val="bg2">
+                    <a:lumMod val="50000"/>
+                  </a:schemeClr>
+                </a:solidFill>
+                <a:latin typeface="Consolas"/>
+                <a:cs typeface="Consolas"/>
+              </a:rPr>
+              <a:t>=[‘m1’,‘m2’]           </a:t>
+            </a:r>
+            <a:r>
+              <a:rPr lang="en-US" sz="1200" dirty="0" err="1" smtClean="0">
+                <a:solidFill>
+                  <a:schemeClr val="bg2">
+                    <a:lumMod val="50000"/>
+                  </a:schemeClr>
+                </a:solidFill>
+                <a:latin typeface="Consolas"/>
+                <a:cs typeface="Consolas"/>
+              </a:rPr>
+              <a:t>for_each</a:t>
+            </a:r>
+            <a:r>
+              <a:rPr lang="en-US" sz="1200" dirty="0" smtClean="0">
+                <a:solidFill>
+                  <a:schemeClr val="bg2">
+                    <a:lumMod val="50000"/>
+                  </a:schemeClr>
+                </a:solidFill>
+                <a:latin typeface="Consolas"/>
+                <a:cs typeface="Consolas"/>
+              </a:rPr>
+              <a:t>=‘</a:t>
+            </a:r>
+            <a:r>
+              <a:rPr lang="en-US" sz="1200" dirty="0" err="1" smtClean="0">
+                <a:solidFill>
+                  <a:schemeClr val="bg2">
+                    <a:lumMod val="50000"/>
+                  </a:schemeClr>
+                </a:solidFill>
+                <a:latin typeface="Consolas"/>
+                <a:cs typeface="Consolas"/>
+              </a:rPr>
+              <a:t>var</a:t>
+            </a:r>
+            <a:r>
+              <a:rPr lang="en-US" sz="1200" dirty="0" smtClean="0">
+                <a:solidFill>
+                  <a:schemeClr val="bg2">
+                    <a:lumMod val="50000"/>
+                  </a:schemeClr>
+                </a:solidFill>
+                <a:latin typeface="Consolas"/>
+                <a:cs typeface="Consolas"/>
+              </a:rPr>
+              <a:t>’</a:t>
+            </a:r>
+            <a:endParaRPr lang="en-US" sz="1200" dirty="0">
+              <a:solidFill>
+                <a:schemeClr val="bg2">
+                  <a:lumMod val="50000"/>
+                </a:schemeClr>
+              </a:solidFill>
+              <a:latin typeface="Consolas"/>
+              <a:cs typeface="Consolas"/>
+            </a:endParaRPr>
+          </a:p>
+        </p:txBody>
+      </p:sp>
+      <p:sp>
+        <p:nvSpPr>
+          <p:cNvPr id="3" name="TextBox 2"/>
+          <p:cNvSpPr txBox="1"/>
+          <p:nvPr/>
+        </p:nvSpPr>
+        <p:spPr>
+          <a:xfrm>
+            <a:off x="1083165" y="6176877"/>
+            <a:ext cx="1961444" cy="276999"/>
+          </a:xfrm>
+          <a:prstGeom prst="rect">
+            <a:avLst/>
+          </a:prstGeom>
+          <a:noFill/>
+        </p:spPr>
+        <p:txBody>
+          <a:bodyPr wrap="none" rtlCol="0">
+            <a:spAutoFit/>
+          </a:bodyPr>
+          <a:lstStyle/>
+          <a:p>
+            <a:r>
+              <a:rPr lang="en-US" sz="1200" dirty="0">
+                <a:solidFill>
+                  <a:schemeClr val="bg2">
+                    <a:lumMod val="50000"/>
+                  </a:schemeClr>
+                </a:solidFill>
+                <a:latin typeface="Consolas"/>
+                <a:cs typeface="Consolas"/>
+              </a:rPr>
+              <a:t>[‘b1’</a:t>
+            </a:r>
+            <a:r>
+              <a:rPr lang="en-US" sz="1200" dirty="0" smtClean="0">
+                <a:solidFill>
+                  <a:schemeClr val="bg2">
+                    <a:lumMod val="50000"/>
+                  </a:schemeClr>
+                </a:solidFill>
+                <a:latin typeface="Consolas"/>
+                <a:cs typeface="Consolas"/>
+              </a:rPr>
+              <a:t>,‘</a:t>
+            </a:r>
+            <a:r>
+              <a:rPr lang="en-US" sz="1200" dirty="0">
+                <a:solidFill>
+                  <a:schemeClr val="bg2">
+                    <a:lumMod val="50000"/>
+                  </a:schemeClr>
+                </a:solidFill>
+                <a:latin typeface="Consolas"/>
+                <a:cs typeface="Consolas"/>
+              </a:rPr>
+              <a:t>b2’</a:t>
+            </a:r>
+            <a:r>
+              <a:rPr lang="en-US" sz="1200" dirty="0" smtClean="0">
+                <a:solidFill>
+                  <a:schemeClr val="bg2">
+                    <a:lumMod val="50000"/>
+                  </a:schemeClr>
+                </a:solidFill>
+                <a:latin typeface="Consolas"/>
+                <a:cs typeface="Consolas"/>
+              </a:rPr>
+              <a:t>,‘</a:t>
+            </a:r>
+            <a:r>
+              <a:rPr lang="en-US" sz="1200" dirty="0">
+                <a:solidFill>
+                  <a:schemeClr val="bg2">
+                    <a:lumMod val="50000"/>
+                  </a:schemeClr>
+                </a:solidFill>
+                <a:latin typeface="Consolas"/>
+                <a:cs typeface="Consolas"/>
+              </a:rPr>
+              <a:t>b3’</a:t>
+            </a:r>
+            <a:r>
+              <a:rPr lang="en-US" sz="1200" dirty="0" smtClean="0">
+                <a:solidFill>
+                  <a:schemeClr val="bg2">
+                    <a:lumMod val="50000"/>
+                  </a:schemeClr>
+                </a:solidFill>
+                <a:latin typeface="Consolas"/>
+                <a:cs typeface="Consolas"/>
+              </a:rPr>
+              <a:t>,‘</a:t>
+            </a:r>
+            <a:r>
+              <a:rPr lang="en-US" sz="1200" dirty="0">
+                <a:solidFill>
+                  <a:schemeClr val="bg2">
+                    <a:lumMod val="50000"/>
+                  </a:schemeClr>
+                </a:solidFill>
+                <a:latin typeface="Consolas"/>
+                <a:cs typeface="Consolas"/>
+              </a:rPr>
+              <a:t>b4’]</a:t>
+            </a:r>
+            <a:endParaRPr lang="en-US" sz="1200" dirty="0"/>
+          </a:p>
+        </p:txBody>
+      </p:sp>
+      <p:sp>
+        <p:nvSpPr>
+          <p:cNvPr id="100" name="TextBox 99"/>
+          <p:cNvSpPr txBox="1"/>
+          <p:nvPr/>
+        </p:nvSpPr>
+        <p:spPr>
+          <a:xfrm>
+            <a:off x="7281301" y="4685395"/>
+            <a:ext cx="1961444" cy="276999"/>
+          </a:xfrm>
+          <a:prstGeom prst="rect">
+            <a:avLst/>
+          </a:prstGeom>
+          <a:noFill/>
+        </p:spPr>
+        <p:txBody>
+          <a:bodyPr wrap="none" rtlCol="0">
+            <a:spAutoFit/>
+          </a:bodyPr>
+          <a:lstStyle/>
+          <a:p>
+            <a:r>
+              <a:rPr lang="en-US" sz="1200" dirty="0">
+                <a:solidFill>
+                  <a:schemeClr val="bg2">
+                    <a:lumMod val="50000"/>
+                  </a:schemeClr>
+                </a:solidFill>
+                <a:latin typeface="Consolas"/>
+                <a:cs typeface="Consolas"/>
+              </a:rPr>
+              <a:t>[‘b1’</a:t>
+            </a:r>
+            <a:r>
+              <a:rPr lang="en-US" sz="1200" dirty="0" smtClean="0">
+                <a:solidFill>
+                  <a:schemeClr val="bg2">
+                    <a:lumMod val="50000"/>
+                  </a:schemeClr>
+                </a:solidFill>
+                <a:latin typeface="Consolas"/>
+                <a:cs typeface="Consolas"/>
+              </a:rPr>
+              <a:t>,‘</a:t>
+            </a:r>
+            <a:r>
+              <a:rPr lang="en-US" sz="1200" dirty="0">
+                <a:solidFill>
+                  <a:schemeClr val="bg2">
+                    <a:lumMod val="50000"/>
+                  </a:schemeClr>
+                </a:solidFill>
+                <a:latin typeface="Consolas"/>
+                <a:cs typeface="Consolas"/>
+              </a:rPr>
+              <a:t>b2’</a:t>
+            </a:r>
+            <a:r>
+              <a:rPr lang="en-US" sz="1200" dirty="0" smtClean="0">
+                <a:solidFill>
+                  <a:schemeClr val="bg2">
+                    <a:lumMod val="50000"/>
+                  </a:schemeClr>
+                </a:solidFill>
+                <a:latin typeface="Consolas"/>
+                <a:cs typeface="Consolas"/>
+              </a:rPr>
+              <a:t>,‘</a:t>
+            </a:r>
+            <a:r>
+              <a:rPr lang="en-US" sz="1200" dirty="0">
+                <a:solidFill>
+                  <a:schemeClr val="bg2">
+                    <a:lumMod val="50000"/>
+                  </a:schemeClr>
+                </a:solidFill>
+                <a:latin typeface="Consolas"/>
+                <a:cs typeface="Consolas"/>
+              </a:rPr>
+              <a:t>b3’</a:t>
+            </a:r>
+            <a:r>
+              <a:rPr lang="en-US" sz="1200" dirty="0" smtClean="0">
+                <a:solidFill>
+                  <a:schemeClr val="bg2">
+                    <a:lumMod val="50000"/>
+                  </a:schemeClr>
+                </a:solidFill>
+                <a:latin typeface="Consolas"/>
+                <a:cs typeface="Consolas"/>
+              </a:rPr>
+              <a:t>,‘</a:t>
+            </a:r>
+            <a:r>
+              <a:rPr lang="en-US" sz="1200" dirty="0">
+                <a:solidFill>
+                  <a:schemeClr val="bg2">
+                    <a:lumMod val="50000"/>
+                  </a:schemeClr>
+                </a:solidFill>
+                <a:latin typeface="Consolas"/>
+                <a:cs typeface="Consolas"/>
+              </a:rPr>
+              <a:t>b4’]</a:t>
+            </a:r>
+            <a:endParaRPr lang="en-US" sz="1200" dirty="0"/>
+          </a:p>
+        </p:txBody>
+      </p:sp>
+      <p:sp>
+        <p:nvSpPr>
+          <p:cNvPr id="4" name="Rectangle 3"/>
+          <p:cNvSpPr/>
+          <p:nvPr/>
+        </p:nvSpPr>
+        <p:spPr>
+          <a:xfrm>
+            <a:off x="3749874" y="2259322"/>
+            <a:ext cx="1623010" cy="276999"/>
+          </a:xfrm>
+          <a:prstGeom prst="rect">
+            <a:avLst/>
+          </a:prstGeom>
+        </p:spPr>
+        <p:txBody>
+          <a:bodyPr wrap="none">
+            <a:spAutoFit/>
+          </a:bodyPr>
+          <a:lstStyle/>
+          <a:p>
+            <a:r>
+              <a:rPr lang="en-US" sz="1200" dirty="0" err="1" smtClean="0">
+                <a:solidFill>
+                  <a:schemeClr val="bg2">
+                    <a:lumMod val="50000"/>
+                  </a:schemeClr>
+                </a:solidFill>
+                <a:latin typeface="Consolas"/>
+                <a:cs typeface="Consolas"/>
+              </a:rPr>
+              <a:t>group_by</a:t>
+            </a:r>
+            <a:r>
+              <a:rPr lang="en-US" sz="1200" dirty="0">
+                <a:solidFill>
+                  <a:schemeClr val="bg2">
+                    <a:lumMod val="50000"/>
+                  </a:schemeClr>
+                </a:solidFill>
+                <a:latin typeface="Consolas"/>
+                <a:cs typeface="Consolas"/>
+              </a:rPr>
+              <a:t>=‘single’</a:t>
+            </a:r>
+            <a:endParaRPr lang="en-US" sz="1200" dirty="0"/>
+          </a:p>
+        </p:txBody>
+      </p:sp>
+      <p:sp>
+        <p:nvSpPr>
+          <p:cNvPr id="7" name="Rectangle 6"/>
+          <p:cNvSpPr/>
+          <p:nvPr/>
+        </p:nvSpPr>
+        <p:spPr>
+          <a:xfrm>
+            <a:off x="6166152" y="2280226"/>
+            <a:ext cx="2807529" cy="276999"/>
+          </a:xfrm>
+          <a:prstGeom prst="rect">
+            <a:avLst/>
+          </a:prstGeom>
+        </p:spPr>
+        <p:txBody>
+          <a:bodyPr wrap="none">
+            <a:spAutoFit/>
+          </a:bodyPr>
+          <a:lstStyle/>
+          <a:p>
+            <a:r>
+              <a:rPr lang="en-US" sz="1200" dirty="0" err="1">
+                <a:solidFill>
+                  <a:schemeClr val="bg2">
+                    <a:lumMod val="50000"/>
+                  </a:schemeClr>
+                </a:solidFill>
+                <a:latin typeface="Consolas"/>
+                <a:cs typeface="Consolas"/>
+              </a:rPr>
+              <a:t>var</a:t>
+            </a:r>
+            <a:r>
+              <a:rPr lang="en-US" sz="1200" dirty="0">
+                <a:solidFill>
+                  <a:schemeClr val="bg2">
+                    <a:lumMod val="50000"/>
+                  </a:schemeClr>
+                </a:solidFill>
+                <a:latin typeface="Consolas"/>
+                <a:cs typeface="Consolas"/>
+              </a:rPr>
+              <a:t>=[‘m1’,‘m2’</a:t>
+            </a:r>
+            <a:r>
+              <a:rPr lang="en-US" sz="1200" dirty="0" smtClean="0">
+                <a:solidFill>
+                  <a:schemeClr val="bg2">
+                    <a:lumMod val="50000"/>
+                  </a:schemeClr>
+                </a:solidFill>
+                <a:latin typeface="Consolas"/>
+                <a:cs typeface="Consolas"/>
+              </a:rPr>
+              <a:t>], </a:t>
+            </a:r>
+            <a:r>
+              <a:rPr lang="en-US" sz="1200" dirty="0" err="1" smtClean="0">
+                <a:solidFill>
+                  <a:schemeClr val="bg2">
+                    <a:lumMod val="50000"/>
+                  </a:schemeClr>
+                </a:solidFill>
+                <a:latin typeface="Consolas"/>
+                <a:cs typeface="Consolas"/>
+              </a:rPr>
+              <a:t>for_each</a:t>
+            </a:r>
+            <a:r>
+              <a:rPr lang="en-US" sz="1200" dirty="0">
+                <a:solidFill>
+                  <a:schemeClr val="bg2">
+                    <a:lumMod val="50000"/>
+                  </a:schemeClr>
+                </a:solidFill>
+                <a:latin typeface="Consolas"/>
+                <a:cs typeface="Consolas"/>
+              </a:rPr>
+              <a:t>=‘</a:t>
+            </a:r>
+            <a:r>
+              <a:rPr lang="en-US" sz="1200" dirty="0" err="1">
+                <a:solidFill>
+                  <a:schemeClr val="bg2">
+                    <a:lumMod val="50000"/>
+                  </a:schemeClr>
+                </a:solidFill>
+                <a:latin typeface="Consolas"/>
+                <a:cs typeface="Consolas"/>
+              </a:rPr>
+              <a:t>var</a:t>
+            </a:r>
+            <a:r>
+              <a:rPr lang="en-US" sz="1200" dirty="0">
+                <a:solidFill>
+                  <a:schemeClr val="bg2">
+                    <a:lumMod val="50000"/>
+                  </a:schemeClr>
+                </a:solidFill>
+                <a:latin typeface="Consolas"/>
+                <a:cs typeface="Consolas"/>
+              </a:rPr>
+              <a:t>’</a:t>
+            </a:r>
+            <a:endParaRPr lang="en-US" sz="1200" dirty="0">
+              <a:solidFill>
+                <a:schemeClr val="bg2">
+                  <a:lumMod val="50000"/>
+                </a:schemeClr>
+              </a:solidFill>
+              <a:latin typeface="Consolas"/>
+              <a:cs typeface="Consolas"/>
+            </a:endParaRPr>
+          </a:p>
+        </p:txBody>
+      </p:sp>
+      <p:sp>
+        <p:nvSpPr>
+          <p:cNvPr id="101" name="Rectangle 100"/>
+          <p:cNvSpPr/>
+          <p:nvPr/>
+        </p:nvSpPr>
+        <p:spPr>
+          <a:xfrm>
+            <a:off x="3902899" y="1913182"/>
+            <a:ext cx="692317" cy="276999"/>
+          </a:xfrm>
+          <a:prstGeom prst="rect">
+            <a:avLst/>
+          </a:prstGeom>
+        </p:spPr>
+        <p:txBody>
+          <a:bodyPr wrap="none">
+            <a:spAutoFit/>
+          </a:bodyPr>
+          <a:lstStyle/>
+          <a:p>
+            <a:r>
+              <a:rPr lang="en-US" sz="1200" dirty="0" smtClean="0">
+                <a:solidFill>
+                  <a:schemeClr val="bg2">
+                    <a:lumMod val="50000"/>
+                  </a:schemeClr>
+                </a:solidFill>
+                <a:latin typeface="Consolas"/>
+                <a:cs typeface="Consolas"/>
+              </a:rPr>
+              <a:t>[‘s2’]</a:t>
+            </a:r>
+            <a:endParaRPr lang="en-US" sz="1200" dirty="0"/>
+          </a:p>
+        </p:txBody>
+      </p:sp>
+      <p:sp>
+        <p:nvSpPr>
+          <p:cNvPr id="105" name="Rectangle 104"/>
+          <p:cNvSpPr/>
+          <p:nvPr/>
+        </p:nvSpPr>
+        <p:spPr>
+          <a:xfrm>
+            <a:off x="3900989" y="1068502"/>
+            <a:ext cx="692317" cy="276999"/>
+          </a:xfrm>
+          <a:prstGeom prst="rect">
+            <a:avLst/>
+          </a:prstGeom>
+        </p:spPr>
+        <p:txBody>
+          <a:bodyPr wrap="none">
+            <a:spAutoFit/>
+          </a:bodyPr>
+          <a:lstStyle/>
+          <a:p>
+            <a:r>
+              <a:rPr lang="en-US" sz="1200" dirty="0" smtClean="0">
+                <a:solidFill>
+                  <a:schemeClr val="bg2">
+                    <a:lumMod val="50000"/>
+                  </a:schemeClr>
+                </a:solidFill>
+                <a:latin typeface="Consolas"/>
+                <a:cs typeface="Consolas"/>
+              </a:rPr>
+              <a:t>[‘s1’]</a:t>
+            </a:r>
+            <a:endParaRPr lang="en-US" sz="1200" dirty="0"/>
+          </a:p>
+        </p:txBody>
+      </p:sp>
+      <p:sp>
+        <p:nvSpPr>
+          <p:cNvPr id="107" name="Rectangle 106"/>
+          <p:cNvSpPr/>
+          <p:nvPr/>
+        </p:nvSpPr>
+        <p:spPr>
+          <a:xfrm>
+            <a:off x="5951725" y="1589627"/>
+            <a:ext cx="1115359" cy="276999"/>
+          </a:xfrm>
+          <a:prstGeom prst="rect">
+            <a:avLst/>
+          </a:prstGeom>
+        </p:spPr>
+        <p:txBody>
+          <a:bodyPr wrap="none">
+            <a:spAutoFit/>
+          </a:bodyPr>
+          <a:lstStyle/>
+          <a:p>
+            <a:r>
+              <a:rPr lang="en-US" sz="1200" dirty="0" smtClean="0">
+                <a:solidFill>
+                  <a:schemeClr val="bg2">
+                    <a:lumMod val="50000"/>
+                  </a:schemeClr>
+                </a:solidFill>
+                <a:latin typeface="Consolas"/>
+                <a:cs typeface="Consolas"/>
+              </a:rPr>
+              <a:t>[‘s1’,‘s2’]</a:t>
+            </a:r>
+            <a:endParaRPr lang="en-US" sz="1200" dirty="0"/>
+          </a:p>
+        </p:txBody>
+      </p:sp>
+      <p:sp>
+        <p:nvSpPr>
+          <p:cNvPr id="109" name="Rectangle 108"/>
+          <p:cNvSpPr/>
+          <p:nvPr/>
+        </p:nvSpPr>
+        <p:spPr>
+          <a:xfrm>
+            <a:off x="204881" y="4399149"/>
+            <a:ext cx="1115359" cy="276999"/>
+          </a:xfrm>
+          <a:prstGeom prst="rect">
+            <a:avLst/>
+          </a:prstGeom>
+        </p:spPr>
+        <p:txBody>
+          <a:bodyPr wrap="none">
+            <a:spAutoFit/>
+          </a:bodyPr>
+          <a:lstStyle/>
+          <a:p>
+            <a:r>
+              <a:rPr lang="en-US" sz="1200" dirty="0" smtClean="0">
+                <a:solidFill>
+                  <a:schemeClr val="bg2">
+                    <a:lumMod val="50000"/>
+                  </a:schemeClr>
+                </a:solidFill>
+                <a:latin typeface="Consolas"/>
+                <a:cs typeface="Consolas"/>
+              </a:rPr>
+              <a:t>[‘a1’,‘a2’]</a:t>
+            </a:r>
+            <a:endParaRPr lang="en-US" sz="1200" dirty="0"/>
+          </a:p>
+        </p:txBody>
+      </p:sp>
+      <p:sp>
+        <p:nvSpPr>
+          <p:cNvPr id="111" name="Rectangle 110"/>
+          <p:cNvSpPr/>
+          <p:nvPr/>
+        </p:nvSpPr>
+        <p:spPr>
+          <a:xfrm>
+            <a:off x="7046817" y="1121914"/>
+            <a:ext cx="523100" cy="276999"/>
+          </a:xfrm>
+          <a:prstGeom prst="rect">
+            <a:avLst/>
+          </a:prstGeom>
+        </p:spPr>
+        <p:txBody>
+          <a:bodyPr wrap="none">
+            <a:spAutoFit/>
+          </a:bodyPr>
+          <a:lstStyle/>
+          <a:p>
+            <a:r>
+              <a:rPr lang="en-US" sz="1200" dirty="0" smtClean="0">
+                <a:solidFill>
+                  <a:schemeClr val="bg2">
+                    <a:lumMod val="50000"/>
+                  </a:schemeClr>
+                </a:solidFill>
+                <a:latin typeface="Consolas"/>
+                <a:cs typeface="Consolas"/>
+              </a:rPr>
+              <a:t>‘m1’</a:t>
+            </a:r>
+            <a:endParaRPr lang="en-US" sz="1200" dirty="0"/>
+          </a:p>
+        </p:txBody>
+      </p:sp>
+      <p:sp>
+        <p:nvSpPr>
+          <p:cNvPr id="112" name="Rectangle 111"/>
+          <p:cNvSpPr/>
+          <p:nvPr/>
+        </p:nvSpPr>
+        <p:spPr>
+          <a:xfrm>
+            <a:off x="7046817" y="1986527"/>
+            <a:ext cx="523100" cy="276999"/>
+          </a:xfrm>
+          <a:prstGeom prst="rect">
+            <a:avLst/>
+          </a:prstGeom>
+        </p:spPr>
+        <p:txBody>
+          <a:bodyPr wrap="none">
+            <a:spAutoFit/>
+          </a:bodyPr>
+          <a:lstStyle/>
+          <a:p>
+            <a:r>
+              <a:rPr lang="en-US" sz="1200" dirty="0" smtClean="0">
+                <a:solidFill>
+                  <a:schemeClr val="bg2">
+                    <a:lumMod val="50000"/>
+                  </a:schemeClr>
+                </a:solidFill>
+                <a:latin typeface="Consolas"/>
+                <a:cs typeface="Consolas"/>
+              </a:rPr>
+              <a:t>‘m2’</a:t>
+            </a:r>
+            <a:endParaRPr lang="en-US" sz="1200" dirty="0"/>
+          </a:p>
+        </p:txBody>
+      </p:sp>
+      <p:sp>
+        <p:nvSpPr>
+          <p:cNvPr id="113" name="Rectangle 112"/>
+          <p:cNvSpPr/>
+          <p:nvPr/>
+        </p:nvSpPr>
+        <p:spPr>
+          <a:xfrm>
+            <a:off x="4121727" y="4046446"/>
+            <a:ext cx="692317" cy="276999"/>
+          </a:xfrm>
+          <a:prstGeom prst="rect">
+            <a:avLst/>
+          </a:prstGeom>
+        </p:spPr>
+        <p:txBody>
+          <a:bodyPr wrap="none">
+            <a:spAutoFit/>
+          </a:bodyPr>
+          <a:lstStyle/>
+          <a:p>
+            <a:r>
+              <a:rPr lang="en-US" sz="1200" dirty="0" smtClean="0">
+                <a:solidFill>
+                  <a:schemeClr val="bg2">
+                    <a:lumMod val="50000"/>
+                  </a:schemeClr>
+                </a:solidFill>
+                <a:latin typeface="Consolas"/>
+                <a:cs typeface="Consolas"/>
+              </a:rPr>
+              <a:t>[‘a1’]</a:t>
+            </a:r>
+            <a:endParaRPr lang="en-US" sz="1200" dirty="0"/>
+          </a:p>
+        </p:txBody>
+      </p:sp>
+      <p:sp>
+        <p:nvSpPr>
+          <p:cNvPr id="117" name="Rectangle 116"/>
+          <p:cNvSpPr/>
+          <p:nvPr/>
+        </p:nvSpPr>
+        <p:spPr>
+          <a:xfrm>
+            <a:off x="4139225" y="5483989"/>
+            <a:ext cx="692317" cy="276999"/>
+          </a:xfrm>
+          <a:prstGeom prst="rect">
+            <a:avLst/>
+          </a:prstGeom>
+        </p:spPr>
+        <p:txBody>
+          <a:bodyPr wrap="none">
+            <a:spAutoFit/>
+          </a:bodyPr>
+          <a:lstStyle/>
+          <a:p>
+            <a:r>
+              <a:rPr lang="en-US" sz="1200" dirty="0" smtClean="0">
+                <a:solidFill>
+                  <a:schemeClr val="bg2">
+                    <a:lumMod val="50000"/>
+                  </a:schemeClr>
+                </a:solidFill>
+                <a:latin typeface="Consolas"/>
+                <a:cs typeface="Consolas"/>
+              </a:rPr>
+              <a:t>[‘a2’]</a:t>
+            </a:r>
+            <a:endParaRPr lang="en-US" sz="1200" dirty="0"/>
+          </a:p>
+        </p:txBody>
+      </p:sp>
+      <p:sp>
+        <p:nvSpPr>
+          <p:cNvPr id="118" name="Rectangle 117"/>
+          <p:cNvSpPr/>
+          <p:nvPr/>
+        </p:nvSpPr>
+        <p:spPr>
+          <a:xfrm>
+            <a:off x="5051237" y="3584799"/>
+            <a:ext cx="523100" cy="276999"/>
+          </a:xfrm>
+          <a:prstGeom prst="rect">
+            <a:avLst/>
+          </a:prstGeom>
+        </p:spPr>
+        <p:txBody>
+          <a:bodyPr wrap="none">
+            <a:spAutoFit/>
+          </a:bodyPr>
+          <a:lstStyle/>
+          <a:p>
+            <a:r>
+              <a:rPr lang="en-US" sz="1200" dirty="0" smtClean="0">
+                <a:solidFill>
+                  <a:schemeClr val="bg2">
+                    <a:lumMod val="50000"/>
+                  </a:schemeClr>
+                </a:solidFill>
+                <a:latin typeface="Consolas"/>
+                <a:cs typeface="Consolas"/>
+              </a:rPr>
+              <a:t>‘m1’</a:t>
+            </a:r>
+            <a:endParaRPr lang="en-US" sz="1200" dirty="0"/>
+          </a:p>
+        </p:txBody>
+      </p:sp>
+      <p:sp>
+        <p:nvSpPr>
+          <p:cNvPr id="120" name="Rectangle 119"/>
+          <p:cNvSpPr/>
+          <p:nvPr/>
+        </p:nvSpPr>
+        <p:spPr>
+          <a:xfrm>
+            <a:off x="5111334" y="5055052"/>
+            <a:ext cx="523100" cy="276999"/>
+          </a:xfrm>
+          <a:prstGeom prst="rect">
+            <a:avLst/>
+          </a:prstGeom>
+        </p:spPr>
+        <p:txBody>
+          <a:bodyPr wrap="none">
+            <a:spAutoFit/>
+          </a:bodyPr>
+          <a:lstStyle/>
+          <a:p>
+            <a:r>
+              <a:rPr lang="en-US" sz="1200" dirty="0" smtClean="0">
+                <a:solidFill>
+                  <a:schemeClr val="bg2">
+                    <a:lumMod val="50000"/>
+                  </a:schemeClr>
+                </a:solidFill>
+                <a:latin typeface="Consolas"/>
+                <a:cs typeface="Consolas"/>
+              </a:rPr>
+              <a:t>‘m1’</a:t>
+            </a:r>
+            <a:endParaRPr lang="en-US" sz="1200" dirty="0"/>
+          </a:p>
+        </p:txBody>
+      </p:sp>
+      <p:sp>
+        <p:nvSpPr>
+          <p:cNvPr id="121" name="Rectangle 120"/>
+          <p:cNvSpPr/>
+          <p:nvPr/>
+        </p:nvSpPr>
+        <p:spPr>
+          <a:xfrm>
+            <a:off x="5038081" y="4420971"/>
+            <a:ext cx="523100" cy="276999"/>
+          </a:xfrm>
+          <a:prstGeom prst="rect">
+            <a:avLst/>
+          </a:prstGeom>
+        </p:spPr>
+        <p:txBody>
+          <a:bodyPr wrap="none">
+            <a:spAutoFit/>
+          </a:bodyPr>
+          <a:lstStyle/>
+          <a:p>
+            <a:r>
+              <a:rPr lang="en-US" sz="1200" dirty="0" smtClean="0">
+                <a:solidFill>
+                  <a:schemeClr val="bg2">
+                    <a:lumMod val="50000"/>
+                  </a:schemeClr>
+                </a:solidFill>
+                <a:latin typeface="Consolas"/>
+                <a:cs typeface="Consolas"/>
+              </a:rPr>
+              <a:t>‘m2’</a:t>
+            </a:r>
+            <a:endParaRPr lang="en-US" sz="1200" dirty="0"/>
+          </a:p>
+        </p:txBody>
+      </p:sp>
+      <p:sp>
+        <p:nvSpPr>
+          <p:cNvPr id="123" name="Rectangle 122"/>
+          <p:cNvSpPr/>
+          <p:nvPr/>
+        </p:nvSpPr>
+        <p:spPr>
+          <a:xfrm>
+            <a:off x="5057789" y="5879153"/>
+            <a:ext cx="523100" cy="276999"/>
+          </a:xfrm>
+          <a:prstGeom prst="rect">
+            <a:avLst/>
+          </a:prstGeom>
+        </p:spPr>
+        <p:txBody>
+          <a:bodyPr wrap="none">
+            <a:spAutoFit/>
+          </a:bodyPr>
+          <a:lstStyle/>
+          <a:p>
+            <a:r>
+              <a:rPr lang="en-US" sz="1200" dirty="0" smtClean="0">
+                <a:solidFill>
+                  <a:schemeClr val="bg2">
+                    <a:lumMod val="50000"/>
+                  </a:schemeClr>
+                </a:solidFill>
+                <a:latin typeface="Consolas"/>
+                <a:cs typeface="Consolas"/>
+              </a:rPr>
+              <a:t>‘m2’</a:t>
+            </a:r>
+            <a:endParaRPr lang="en-US" sz="1200" dirty="0"/>
+          </a:p>
+        </p:txBody>
+      </p:sp>
+      <p:sp>
+        <p:nvSpPr>
+          <p:cNvPr id="124" name="Rectangle 123"/>
+          <p:cNvSpPr/>
+          <p:nvPr/>
+        </p:nvSpPr>
+        <p:spPr>
+          <a:xfrm>
+            <a:off x="135163" y="1065713"/>
+            <a:ext cx="1115359" cy="276999"/>
+          </a:xfrm>
+          <a:prstGeom prst="rect">
+            <a:avLst/>
+          </a:prstGeom>
+        </p:spPr>
+        <p:txBody>
+          <a:bodyPr wrap="none">
+            <a:spAutoFit/>
+          </a:bodyPr>
+          <a:lstStyle/>
+          <a:p>
+            <a:r>
+              <a:rPr lang="en-US" sz="1200" dirty="0" smtClean="0">
+                <a:solidFill>
+                  <a:schemeClr val="bg2">
+                    <a:lumMod val="50000"/>
+                  </a:schemeClr>
+                </a:solidFill>
+                <a:latin typeface="Consolas"/>
+                <a:cs typeface="Consolas"/>
+              </a:rPr>
+              <a:t>[‘s1’,‘s2’]</a:t>
+            </a:r>
+            <a:endParaRPr lang="en-US" sz="1200" dirty="0"/>
+          </a:p>
+        </p:txBody>
+      </p:sp>
+      <p:sp>
+        <p:nvSpPr>
+          <p:cNvPr id="125" name="Rectangle 124"/>
+          <p:cNvSpPr/>
+          <p:nvPr/>
+        </p:nvSpPr>
+        <p:spPr>
+          <a:xfrm>
+            <a:off x="2945823" y="4719170"/>
+            <a:ext cx="1115359" cy="276999"/>
+          </a:xfrm>
+          <a:prstGeom prst="rect">
+            <a:avLst/>
+          </a:prstGeom>
+        </p:spPr>
+        <p:txBody>
+          <a:bodyPr wrap="none">
+            <a:spAutoFit/>
+          </a:bodyPr>
+          <a:lstStyle/>
+          <a:p>
+            <a:r>
+              <a:rPr lang="en-US" sz="1200" dirty="0" smtClean="0">
+                <a:solidFill>
+                  <a:schemeClr val="bg2">
+                    <a:lumMod val="50000"/>
+                  </a:schemeClr>
+                </a:solidFill>
+                <a:latin typeface="Consolas"/>
+                <a:cs typeface="Consolas"/>
+              </a:rPr>
+              <a:t>[‘s1’,‘s2’]</a:t>
+            </a:r>
+            <a:endParaRPr lang="en-US" sz="1200" dirty="0"/>
           </a:p>
         </p:txBody>
       </p:sp>

</xml_diff>